<commit_message>
Update pptx and pdfs
</commit_message>
<xml_diff>
--- a/lessons/part_1/production_1.pptx
+++ b/lessons/part_1/production_1.pptx
@@ -221,9 +221,9 @@
             </a:lvl1pPr>
           </a:lstStyle>
           <a:p>
-            <a:fld id="{E471C5A1-87B1-4585-AEF8-35678BE9CE54}" type="datetimeFigureOut">
+            <a:fld id="{A6C9D088-CBEB-45E0-A686-66BA8F82DFD5}" type="datetimeFigureOut">
               <a:rPr lang="en-CA" smtClean="0"/>
-              <a:t>2024-02-05</a:t>
+              <a:t>2024-02-09</a:t>
             </a:fld>
             <a:endParaRPr lang="en-CA"/>
           </a:p>
@@ -380,7 +380,7 @@
             </a:lvl1pPr>
           </a:lstStyle>
           <a:p>
-            <a:fld id="{1599609D-C315-43A6-8DBC-F6613AEFD675}" type="slidenum">
+            <a:fld id="{E9BAD016-3E18-41E0-9557-DC11B3F6176F}" type="slidenum">
               <a:rPr lang="en-CA" smtClean="0"/>
               <a:t>‹#›</a:t>
             </a:fld>
@@ -391,7 +391,7 @@
     </p:spTree>
     <p:extLst>
       <p:ext uri="{BB962C8B-B14F-4D97-AF65-F5344CB8AC3E}">
-        <p14:creationId xmlns:p14="http://schemas.microsoft.com/office/powerpoint/2010/main" val="2085046388"/>
+        <p14:creationId xmlns:p14="http://schemas.microsoft.com/office/powerpoint/2010/main" val="1639043987"/>
       </p:ext>
     </p:extLst>
   </p:cSld>
@@ -688,9 +688,10 @@
           </a:lstStyle>
           <a:p>
             <a:r>
-              <a:rPr lang="en-CA"/>
+              <a:rPr lang="en-US"/>
               <a:t>February 2024</a:t>
             </a:r>
+            <a:endParaRPr lang="en-CA"/>
           </a:p>
         </p:txBody>
       </p:sp>
@@ -720,9 +721,10 @@
           </a:lstStyle>
           <a:p>
             <a:r>
-              <a:rPr lang="en-CA"/>
-              <a:t>Production 1 - Introduction</a:t>
-            </a:r>
+              <a:rPr lang="en-US"/>
+              <a:t>Production 1 - Introduction to ML Systems</a:t>
+            </a:r>
+            <a:endParaRPr lang="en-CA"/>
           </a:p>
         </p:txBody>
       </p:sp>
@@ -880,9 +882,10 @@
           <a:lstStyle/>
           <a:p>
             <a:r>
-              <a:rPr lang="en-CA"/>
+              <a:rPr lang="en-US"/>
               <a:t>February 2024</a:t>
             </a:r>
+            <a:endParaRPr lang="en-CA"/>
           </a:p>
         </p:txBody>
       </p:sp>
@@ -902,9 +905,10 @@
           <a:lstStyle/>
           <a:p>
             <a:r>
-              <a:rPr lang="en-CA"/>
-              <a:t>Production 1 - Introduction</a:t>
-            </a:r>
+              <a:rPr lang="en-US"/>
+              <a:t>Production 1 - Introduction to ML Systems</a:t>
+            </a:r>
+            <a:endParaRPr lang="en-CA"/>
           </a:p>
         </p:txBody>
       </p:sp>
@@ -1062,9 +1066,10 @@
           <a:lstStyle/>
           <a:p>
             <a:r>
-              <a:rPr lang="en-CA"/>
+              <a:rPr lang="en-US"/>
               <a:t>February 2024</a:t>
             </a:r>
+            <a:endParaRPr lang="en-CA"/>
           </a:p>
         </p:txBody>
       </p:sp>
@@ -1084,9 +1089,10 @@
           <a:lstStyle/>
           <a:p>
             <a:r>
-              <a:rPr lang="en-CA"/>
-              <a:t>Production 1 - Introduction</a:t>
-            </a:r>
+              <a:rPr lang="en-US"/>
+              <a:t>Production 1 - Introduction to ML Systems</a:t>
+            </a:r>
+            <a:endParaRPr lang="en-CA"/>
           </a:p>
         </p:txBody>
       </p:sp>
@@ -1234,9 +1240,10 @@
           <a:lstStyle/>
           <a:p>
             <a:r>
-              <a:rPr lang="en-CA"/>
+              <a:rPr lang="en-US"/>
               <a:t>February 2024</a:t>
             </a:r>
+            <a:endParaRPr lang="en-CA"/>
           </a:p>
         </p:txBody>
       </p:sp>
@@ -1256,9 +1263,10 @@
           <a:lstStyle/>
           <a:p>
             <a:r>
-              <a:rPr lang="en-CA"/>
-              <a:t>Production 1 - Introduction</a:t>
-            </a:r>
+              <a:rPr lang="en-US"/>
+              <a:t>Production 1 - Introduction to ML Systems</a:t>
+            </a:r>
+            <a:endParaRPr lang="en-CA"/>
           </a:p>
         </p:txBody>
       </p:sp>
@@ -1492,9 +1500,10 @@
           <a:lstStyle/>
           <a:p>
             <a:r>
-              <a:rPr lang="en-CA"/>
+              <a:rPr lang="en-US"/>
               <a:t>February 2024</a:t>
             </a:r>
+            <a:endParaRPr lang="en-CA"/>
           </a:p>
         </p:txBody>
       </p:sp>
@@ -1514,9 +1523,10 @@
           <a:lstStyle/>
           <a:p>
             <a:r>
-              <a:rPr lang="en-CA"/>
-              <a:t>Production 1 - Introduction</a:t>
-            </a:r>
+              <a:rPr lang="en-US"/>
+              <a:t>Production 1 - Introduction to ML Systems</a:t>
+            </a:r>
+            <a:endParaRPr lang="en-CA"/>
           </a:p>
         </p:txBody>
       </p:sp>
@@ -1782,9 +1792,10 @@
           <a:lstStyle/>
           <a:p>
             <a:r>
-              <a:rPr lang="en-CA"/>
+              <a:rPr lang="en-US"/>
               <a:t>February 2024</a:t>
             </a:r>
+            <a:endParaRPr lang="en-CA"/>
           </a:p>
         </p:txBody>
       </p:sp>
@@ -1804,9 +1815,10 @@
           <a:lstStyle/>
           <a:p>
             <a:r>
-              <a:rPr lang="en-CA"/>
-              <a:t>Production 1 - Introduction</a:t>
-            </a:r>
+              <a:rPr lang="en-US"/>
+              <a:t>Production 1 - Introduction to ML Systems</a:t>
+            </a:r>
+            <a:endParaRPr lang="en-CA"/>
           </a:p>
         </p:txBody>
       </p:sp>
@@ -2222,9 +2234,10 @@
           <a:lstStyle/>
           <a:p>
             <a:r>
-              <a:rPr lang="en-CA"/>
+              <a:rPr lang="en-US"/>
               <a:t>February 2024</a:t>
             </a:r>
+            <a:endParaRPr lang="en-CA"/>
           </a:p>
         </p:txBody>
       </p:sp>
@@ -2244,9 +2257,10 @@
           <a:lstStyle/>
           <a:p>
             <a:r>
-              <a:rPr lang="en-CA"/>
-              <a:t>Production 1 - Introduction</a:t>
-            </a:r>
+              <a:rPr lang="en-US"/>
+              <a:t>Production 1 - Introduction to ML Systems</a:t>
+            </a:r>
+            <a:endParaRPr lang="en-CA"/>
           </a:p>
         </p:txBody>
       </p:sp>
@@ -2342,9 +2356,10 @@
           <a:lstStyle/>
           <a:p>
             <a:r>
-              <a:rPr lang="en-CA"/>
+              <a:rPr lang="en-US"/>
               <a:t>February 2024</a:t>
             </a:r>
+            <a:endParaRPr lang="en-CA"/>
           </a:p>
         </p:txBody>
       </p:sp>
@@ -2364,9 +2379,10 @@
           <a:lstStyle/>
           <a:p>
             <a:r>
-              <a:rPr lang="en-CA"/>
-              <a:t>Production 1 - Introduction</a:t>
-            </a:r>
+              <a:rPr lang="en-US"/>
+              <a:t>Production 1 - Introduction to ML Systems</a:t>
+            </a:r>
+            <a:endParaRPr lang="en-CA"/>
           </a:p>
         </p:txBody>
       </p:sp>
@@ -2439,9 +2455,10 @@
           <a:lstStyle/>
           <a:p>
             <a:r>
-              <a:rPr lang="en-CA"/>
+              <a:rPr lang="en-US"/>
               <a:t>February 2024</a:t>
             </a:r>
+            <a:endParaRPr lang="en-CA"/>
           </a:p>
         </p:txBody>
       </p:sp>
@@ -2461,9 +2478,10 @@
           <a:lstStyle/>
           <a:p>
             <a:r>
-              <a:rPr lang="en-CA"/>
-              <a:t>Production 1 - Introduction</a:t>
-            </a:r>
+              <a:rPr lang="en-US"/>
+              <a:t>Production 1 - Introduction to ML Systems</a:t>
+            </a:r>
+            <a:endParaRPr lang="en-CA"/>
           </a:p>
         </p:txBody>
       </p:sp>
@@ -2797,9 +2815,10 @@
           <a:lstStyle/>
           <a:p>
             <a:r>
-              <a:rPr lang="en-CA"/>
+              <a:rPr lang="en-US"/>
               <a:t>February 2024</a:t>
             </a:r>
+            <a:endParaRPr lang="en-CA"/>
           </a:p>
         </p:txBody>
       </p:sp>
@@ -2819,9 +2838,10 @@
           <a:lstStyle/>
           <a:p>
             <a:r>
-              <a:rPr lang="en-CA"/>
-              <a:t>Production 1 - Introduction</a:t>
-            </a:r>
+              <a:rPr lang="en-US"/>
+              <a:t>Production 1 - Introduction to ML Systems</a:t>
+            </a:r>
+            <a:endParaRPr lang="en-CA"/>
           </a:p>
         </p:txBody>
       </p:sp>
@@ -3115,9 +3135,10 @@
           </a:lstStyle>
           <a:p>
             <a:r>
-              <a:rPr lang="en-CA"/>
+              <a:rPr lang="en-US"/>
               <a:t>February 2024</a:t>
             </a:r>
+            <a:endParaRPr lang="en-CA"/>
           </a:p>
         </p:txBody>
       </p:sp>
@@ -3147,9 +3168,10 @@
           </a:lstStyle>
           <a:p>
             <a:r>
-              <a:rPr lang="en-CA"/>
-              <a:t>Production 1 - Introduction</a:t>
-            </a:r>
+              <a:rPr lang="en-US"/>
+              <a:t>Production 1 - Introduction to ML Systems</a:t>
+            </a:r>
+            <a:endParaRPr lang="en-CA"/>
           </a:p>
         </p:txBody>
       </p:sp>
@@ -3348,9 +3370,10 @@
           </a:lstStyle>
           <a:p>
             <a:r>
-              <a:rPr lang="en-CA"/>
+              <a:rPr lang="en-US"/>
               <a:t>February 2024</a:t>
             </a:r>
+            <a:endParaRPr lang="en-CA"/>
           </a:p>
         </p:txBody>
       </p:sp>
@@ -3388,9 +3411,10 @@
           </a:lstStyle>
           <a:p>
             <a:r>
-              <a:rPr lang="en-CA"/>
-              <a:t>Production 1 - Introduction</a:t>
-            </a:r>
+              <a:rPr lang="en-US"/>
+              <a:t>Production 1 - Introduction to ML Systems</a:t>
+            </a:r>
+            <a:endParaRPr lang="en-CA"/>
           </a:p>
         </p:txBody>
       </p:sp>
@@ -3987,7 +4011,7 @@
           <p:cNvPr id="5" name="Date Placeholder 4">
             <a:extLst>
               <a:ext uri="{FF2B5EF4-FFF2-40B4-BE49-F238E27FC236}">
-                <a16:creationId xmlns:a16="http://schemas.microsoft.com/office/drawing/2014/main" id="{2389BDFF-5258-3934-F393-0AFEF2983087}"/>
+                <a16:creationId xmlns:a16="http://schemas.microsoft.com/office/drawing/2014/main" id="{7FD82622-6352-DE75-404C-ECE6570352C9}"/>
               </a:ext>
             </a:extLst>
           </p:cNvPr>
@@ -4004,9 +4028,10 @@
           <a:lstStyle/>
           <a:p>
             <a:r>
-              <a:rPr lang="en-CA"/>
+              <a:rPr lang="en-US"/>
               <a:t>February 2024</a:t>
             </a:r>
+            <a:endParaRPr lang="en-CA"/>
           </a:p>
         </p:txBody>
       </p:sp>
@@ -4015,7 +4040,7 @@
           <p:cNvPr id="6" name="Footer Placeholder 5">
             <a:extLst>
               <a:ext uri="{FF2B5EF4-FFF2-40B4-BE49-F238E27FC236}">
-                <a16:creationId xmlns:a16="http://schemas.microsoft.com/office/drawing/2014/main" id="{799B34B1-F299-2602-5227-7A0004B017BD}"/>
+                <a16:creationId xmlns:a16="http://schemas.microsoft.com/office/drawing/2014/main" id="{CF0ED164-F04A-0537-19A3-5C62D4A00A1E}"/>
               </a:ext>
             </a:extLst>
           </p:cNvPr>
@@ -4032,9 +4057,10 @@
           <a:lstStyle/>
           <a:p>
             <a:r>
-              <a:rPr lang="en-CA"/>
-              <a:t>Production 1 - Introduction</a:t>
-            </a:r>
+              <a:rPr lang="en-US"/>
+              <a:t>Production 1 - Introduction to ML Systems</a:t>
+            </a:r>
+            <a:endParaRPr lang="en-CA"/>
           </a:p>
         </p:txBody>
       </p:sp>
@@ -4043,7 +4069,7 @@
           <p:cNvPr id="7" name="Slide Number Placeholder 6">
             <a:extLst>
               <a:ext uri="{FF2B5EF4-FFF2-40B4-BE49-F238E27FC236}">
-                <a16:creationId xmlns:a16="http://schemas.microsoft.com/office/drawing/2014/main" id="{709940A1-4FF7-6A87-3067-DBA8C04C0D7B}"/>
+                <a16:creationId xmlns:a16="http://schemas.microsoft.com/office/drawing/2014/main" id="{1F69A4E1-5BEC-FA85-DCCF-561BAB720CE5}"/>
               </a:ext>
             </a:extLst>
           </p:cNvPr>
@@ -4126,7 +4152,7 @@
           <p:cNvPr id="3" name="Date Placeholder 2">
             <a:extLst>
               <a:ext uri="{FF2B5EF4-FFF2-40B4-BE49-F238E27FC236}">
-                <a16:creationId xmlns:a16="http://schemas.microsoft.com/office/drawing/2014/main" id="{45E6921A-8348-BF53-7CA3-775C9F976581}"/>
+                <a16:creationId xmlns:a16="http://schemas.microsoft.com/office/drawing/2014/main" id="{C1E252BD-A194-4415-6460-DCAD9337016A}"/>
               </a:ext>
             </a:extLst>
           </p:cNvPr>
@@ -4143,9 +4169,10 @@
           <a:lstStyle/>
           <a:p>
             <a:r>
-              <a:rPr lang="en-CA"/>
+              <a:rPr lang="en-US"/>
               <a:t>February 2024</a:t>
             </a:r>
+            <a:endParaRPr lang="en-CA"/>
           </a:p>
         </p:txBody>
       </p:sp>
@@ -4154,7 +4181,7 @@
           <p:cNvPr id="4" name="Footer Placeholder 3">
             <a:extLst>
               <a:ext uri="{FF2B5EF4-FFF2-40B4-BE49-F238E27FC236}">
-                <a16:creationId xmlns:a16="http://schemas.microsoft.com/office/drawing/2014/main" id="{EEC0A644-8F52-8D5F-2821-1F07D4D29891}"/>
+                <a16:creationId xmlns:a16="http://schemas.microsoft.com/office/drawing/2014/main" id="{D50FB29C-7851-5EDD-980C-7A0F8CBFE33E}"/>
               </a:ext>
             </a:extLst>
           </p:cNvPr>
@@ -4171,9 +4198,10 @@
           <a:lstStyle/>
           <a:p>
             <a:r>
-              <a:rPr lang="en-CA"/>
-              <a:t>Production 1 - Introduction</a:t>
-            </a:r>
+              <a:rPr lang="en-US"/>
+              <a:t>Production 1 - Introduction to ML Systems</a:t>
+            </a:r>
+            <a:endParaRPr lang="en-CA"/>
           </a:p>
         </p:txBody>
       </p:sp>
@@ -4182,7 +4210,7 @@
           <p:cNvPr id="5" name="Slide Number Placeholder 4">
             <a:extLst>
               <a:ext uri="{FF2B5EF4-FFF2-40B4-BE49-F238E27FC236}">
-                <a16:creationId xmlns:a16="http://schemas.microsoft.com/office/drawing/2014/main" id="{C0D9D855-AF92-5207-46C2-D409ED31C5CB}"/>
+                <a16:creationId xmlns:a16="http://schemas.microsoft.com/office/drawing/2014/main" id="{A9772560-B07E-8EC9-EB1F-AE5DCBF2D457}"/>
               </a:ext>
             </a:extLst>
           </p:cNvPr>
@@ -4386,7 +4414,7 @@
           <p:cNvPr id="5" name="Date Placeholder 4">
             <a:extLst>
               <a:ext uri="{FF2B5EF4-FFF2-40B4-BE49-F238E27FC236}">
-                <a16:creationId xmlns:a16="http://schemas.microsoft.com/office/drawing/2014/main" id="{E57E3369-ED8C-CA5C-D4F6-EEE8F7134383}"/>
+                <a16:creationId xmlns:a16="http://schemas.microsoft.com/office/drawing/2014/main" id="{31E2F3DA-B718-5277-630C-1A211765D001}"/>
               </a:ext>
             </a:extLst>
           </p:cNvPr>
@@ -4403,9 +4431,10 @@
           <a:lstStyle/>
           <a:p>
             <a:r>
-              <a:rPr lang="en-CA"/>
+              <a:rPr lang="en-US"/>
               <a:t>February 2024</a:t>
             </a:r>
+            <a:endParaRPr lang="en-CA"/>
           </a:p>
         </p:txBody>
       </p:sp>
@@ -4414,7 +4443,7 @@
           <p:cNvPr id="6" name="Footer Placeholder 5">
             <a:extLst>
               <a:ext uri="{FF2B5EF4-FFF2-40B4-BE49-F238E27FC236}">
-                <a16:creationId xmlns:a16="http://schemas.microsoft.com/office/drawing/2014/main" id="{3CB2146F-0A3A-67CB-55D2-A33CB7C9E5C5}"/>
+                <a16:creationId xmlns:a16="http://schemas.microsoft.com/office/drawing/2014/main" id="{6F8C6916-B182-A1C0-6B3C-4FD034A726E8}"/>
               </a:ext>
             </a:extLst>
           </p:cNvPr>
@@ -4431,9 +4460,10 @@
           <a:lstStyle/>
           <a:p>
             <a:r>
-              <a:rPr lang="en-CA"/>
-              <a:t>Production 1 - Introduction</a:t>
-            </a:r>
+              <a:rPr lang="en-US"/>
+              <a:t>Production 1 - Introduction to ML Systems</a:t>
+            </a:r>
+            <a:endParaRPr lang="en-CA"/>
           </a:p>
         </p:txBody>
       </p:sp>
@@ -4442,7 +4472,7 @@
           <p:cNvPr id="7" name="Slide Number Placeholder 6">
             <a:extLst>
               <a:ext uri="{FF2B5EF4-FFF2-40B4-BE49-F238E27FC236}">
-                <a16:creationId xmlns:a16="http://schemas.microsoft.com/office/drawing/2014/main" id="{53C6F435-E86E-07F2-F6A8-8789A0A334AD}"/>
+                <a16:creationId xmlns:a16="http://schemas.microsoft.com/office/drawing/2014/main" id="{8A541A27-064F-5271-8B76-27E1AFA4E51D}"/>
               </a:ext>
             </a:extLst>
           </p:cNvPr>
@@ -4646,7 +4676,7 @@
           <p:cNvPr id="5" name="Date Placeholder 4">
             <a:extLst>
               <a:ext uri="{FF2B5EF4-FFF2-40B4-BE49-F238E27FC236}">
-                <a16:creationId xmlns:a16="http://schemas.microsoft.com/office/drawing/2014/main" id="{76EFC835-25CA-D1D8-CA75-C0C61662DD23}"/>
+                <a16:creationId xmlns:a16="http://schemas.microsoft.com/office/drawing/2014/main" id="{2B3AEF5B-B43D-A7DD-CC40-EA9ECBC0C372}"/>
               </a:ext>
             </a:extLst>
           </p:cNvPr>
@@ -4663,9 +4693,10 @@
           <a:lstStyle/>
           <a:p>
             <a:r>
-              <a:rPr lang="en-CA"/>
+              <a:rPr lang="en-US"/>
               <a:t>February 2024</a:t>
             </a:r>
+            <a:endParaRPr lang="en-CA"/>
           </a:p>
         </p:txBody>
       </p:sp>
@@ -4674,7 +4705,7 @@
           <p:cNvPr id="6" name="Footer Placeholder 5">
             <a:extLst>
               <a:ext uri="{FF2B5EF4-FFF2-40B4-BE49-F238E27FC236}">
-                <a16:creationId xmlns:a16="http://schemas.microsoft.com/office/drawing/2014/main" id="{D12C1758-A259-D863-45F5-3EDB4B9FD4EE}"/>
+                <a16:creationId xmlns:a16="http://schemas.microsoft.com/office/drawing/2014/main" id="{CC71ADE2-2143-5A49-A800-866FBF73DAC9}"/>
               </a:ext>
             </a:extLst>
           </p:cNvPr>
@@ -4691,9 +4722,10 @@
           <a:lstStyle/>
           <a:p>
             <a:r>
-              <a:rPr lang="en-CA"/>
-              <a:t>Production 1 - Introduction</a:t>
-            </a:r>
+              <a:rPr lang="en-US"/>
+              <a:t>Production 1 - Introduction to ML Systems</a:t>
+            </a:r>
+            <a:endParaRPr lang="en-CA"/>
           </a:p>
         </p:txBody>
       </p:sp>
@@ -4702,7 +4734,7 @@
           <p:cNvPr id="7" name="Slide Number Placeholder 6">
             <a:extLst>
               <a:ext uri="{FF2B5EF4-FFF2-40B4-BE49-F238E27FC236}">
-                <a16:creationId xmlns:a16="http://schemas.microsoft.com/office/drawing/2014/main" id="{BAA4D4D9-21B9-8C48-2BD2-02E1086321E4}"/>
+                <a16:creationId xmlns:a16="http://schemas.microsoft.com/office/drawing/2014/main" id="{370D08FE-5296-9868-F341-441E01A8B249}"/>
               </a:ext>
             </a:extLst>
           </p:cNvPr>
@@ -4751,96 +4783,6 @@
           <a:chExt cx="0" cy="0"/>
         </a:xfrm>
       </p:grpSpPr>
-      <p:sp>
-        <p:nvSpPr>
-          <p:cNvPr id="2" name="Title 1"/>
-          <p:cNvSpPr>
-            <a:spLocks noGrp="1"/>
-          </p:cNvSpPr>
-          <p:nvPr>
-            <p:ph type="title"/>
-          </p:nvPr>
-        </p:nvSpPr>
-        <p:spPr/>
-        <p:txBody>
-          <a:bodyPr/>
-          <a:lstStyle/>
-          <a:p>
-            <a:pPr marL="0" lvl="0" indent="0">
-              <a:buNone/>
-            </a:pPr>
-            <a:r>
-              <a:t>ML Systems Design</a:t>
-            </a:r>
-          </a:p>
-        </p:txBody>
-      </p:sp>
-      <p:sp>
-        <p:nvSpPr>
-          <p:cNvPr id="3" name="Content Placeholder 2"/>
-          <p:cNvSpPr>
-            <a:spLocks noGrp="1"/>
-          </p:cNvSpPr>
-          <p:nvPr>
-            <p:ph sz="half" idx="1"/>
-          </p:nvPr>
-        </p:nvSpPr>
-        <p:spPr/>
-        <p:txBody>
-          <a:bodyPr>
-            <a:normAutofit fontScale="70000" lnSpcReduction="20000"/>
-          </a:bodyPr>
-          <a:lstStyle/>
-          <a:p>
-            <a:pPr lvl="0"/>
-            <a:r>
-              <a:t>ML methods are not ML systems: the learning method needs to be applied to data, assessed, tuned, deployed, governed, and so on.</a:t>
-            </a:r>
-          </a:p>
-          <a:p>
-            <a:pPr lvl="0"/>
-            <a:r>
-              <a:t>ML system design is a system approach to MLOps, i.e., we will consider the system holistically, including:</a:t>
-            </a:r>
-          </a:p>
-          <a:p>
-            <a:pPr lvl="1"/>
-            <a:r>
-              <a:t>Business requirements.</a:t>
-            </a:r>
-          </a:p>
-          <a:p>
-            <a:pPr lvl="1"/>
-            <a:r>
-              <a:t>Data stack.</a:t>
-            </a:r>
-          </a:p>
-          <a:p>
-            <a:pPr lvl="1"/>
-            <a:r>
-              <a:t>Infrastructure.</a:t>
-            </a:r>
-          </a:p>
-          <a:p>
-            <a:pPr lvl="1"/>
-            <a:r>
-              <a:t>Deployment.</a:t>
-            </a:r>
-          </a:p>
-          <a:p>
-            <a:pPr lvl="1"/>
-            <a:r>
-              <a:t>Monitoring.</a:t>
-            </a:r>
-          </a:p>
-          <a:p>
-            <a:pPr lvl="0"/>
-            <a:r>
-              <a:t>MLOps: a set of tools and best practices for bringing ML into production.</a:t>
-            </a:r>
-          </a:p>
-        </p:txBody>
-      </p:sp>
       <p:pic>
         <p:nvPicPr>
           <p:cNvPr id="4" name="Picture 1" descr="./img/ml_infrastructure.png"/>
@@ -4857,8 +4799,8 @@
         </p:blipFill>
         <p:spPr bwMode="auto">
           <a:xfrm>
-            <a:off x="6007100" y="2806700"/>
-            <a:ext cx="4660900" cy="1612900"/>
+            <a:off x="4640025" y="2333625"/>
+            <a:ext cx="7395050" cy="2559050"/>
           </a:xfrm>
           <a:prstGeom prst="rect">
             <a:avLst/>
@@ -4873,6 +4815,96 @@
       </p:pic>
       <p:sp>
         <p:nvSpPr>
+          <p:cNvPr id="2" name="Title 1"/>
+          <p:cNvSpPr>
+            <a:spLocks noGrp="1"/>
+          </p:cNvSpPr>
+          <p:nvPr>
+            <p:ph type="title"/>
+          </p:nvPr>
+        </p:nvSpPr>
+        <p:spPr/>
+        <p:txBody>
+          <a:bodyPr/>
+          <a:lstStyle/>
+          <a:p>
+            <a:pPr marL="0" lvl="0" indent="0">
+              <a:buNone/>
+            </a:pPr>
+            <a:r>
+              <a:t>ML Systems Design</a:t>
+            </a:r>
+          </a:p>
+        </p:txBody>
+      </p:sp>
+      <p:sp>
+        <p:nvSpPr>
+          <p:cNvPr id="3" name="Content Placeholder 2"/>
+          <p:cNvSpPr>
+            <a:spLocks noGrp="1"/>
+          </p:cNvSpPr>
+          <p:nvPr>
+            <p:ph sz="half" idx="1"/>
+          </p:nvPr>
+        </p:nvSpPr>
+        <p:spPr/>
+        <p:txBody>
+          <a:bodyPr>
+            <a:normAutofit fontScale="70000" lnSpcReduction="20000"/>
+          </a:bodyPr>
+          <a:lstStyle/>
+          <a:p>
+            <a:pPr lvl="0"/>
+            <a:r>
+              <a:t>ML methods are not ML systems: the learning method needs to be applied to data, assessed, tuned, deployed, governed, and so on.</a:t>
+            </a:r>
+          </a:p>
+          <a:p>
+            <a:pPr lvl="0"/>
+            <a:r>
+              <a:t>ML system design is a system approach to MLOps, i.e., we will consider the system holistically, including:</a:t>
+            </a:r>
+          </a:p>
+          <a:p>
+            <a:pPr lvl="1"/>
+            <a:r>
+              <a:t>Business requirements.</a:t>
+            </a:r>
+          </a:p>
+          <a:p>
+            <a:pPr lvl="1"/>
+            <a:r>
+              <a:t>Data stack.</a:t>
+            </a:r>
+          </a:p>
+          <a:p>
+            <a:pPr lvl="1"/>
+            <a:r>
+              <a:t>Infrastructure.</a:t>
+            </a:r>
+          </a:p>
+          <a:p>
+            <a:pPr lvl="1"/>
+            <a:r>
+              <a:t>Deployment.</a:t>
+            </a:r>
+          </a:p>
+          <a:p>
+            <a:pPr lvl="1"/>
+            <a:r>
+              <a:t>Monitoring.</a:t>
+            </a:r>
+          </a:p>
+          <a:p>
+            <a:pPr lvl="0"/>
+            <a:r>
+              <a:t>MLOps: a set of tools and best practices for bringing ML into production.</a:t>
+            </a:r>
+          </a:p>
+        </p:txBody>
+      </p:sp>
+      <p:sp>
+        <p:nvSpPr>
           <p:cNvPr id="5" name="TextBox 3"/>
           <p:cNvSpPr txBox="1"/>
           <p:nvPr/>
@@ -4895,6 +4927,7 @@
               <a:buNone/>
             </a:pPr>
             <a:r>
+              <a:rPr dirty="0"/>
               <a:t>(Sculley, 2019)</a:t>
             </a:r>
           </a:p>
@@ -4905,7 +4938,7 @@
           <p:cNvPr id="6" name="Date Placeholder 5">
             <a:extLst>
               <a:ext uri="{FF2B5EF4-FFF2-40B4-BE49-F238E27FC236}">
-                <a16:creationId xmlns:a16="http://schemas.microsoft.com/office/drawing/2014/main" id="{0DC9EB09-A52D-D6A2-362C-FDF589F66790}"/>
+                <a16:creationId xmlns:a16="http://schemas.microsoft.com/office/drawing/2014/main" id="{9C668585-FB41-E032-7388-BA09CF2ED5B2}"/>
               </a:ext>
             </a:extLst>
           </p:cNvPr>
@@ -4922,9 +4955,10 @@
           <a:lstStyle/>
           <a:p>
             <a:r>
-              <a:rPr lang="en-CA"/>
+              <a:rPr lang="en-US"/>
               <a:t>February 2024</a:t>
             </a:r>
+            <a:endParaRPr lang="en-CA"/>
           </a:p>
         </p:txBody>
       </p:sp>
@@ -4933,7 +4967,7 @@
           <p:cNvPr id="7" name="Footer Placeholder 6">
             <a:extLst>
               <a:ext uri="{FF2B5EF4-FFF2-40B4-BE49-F238E27FC236}">
-                <a16:creationId xmlns:a16="http://schemas.microsoft.com/office/drawing/2014/main" id="{3E57414D-C12E-3DB7-CCDE-87A414530E87}"/>
+                <a16:creationId xmlns:a16="http://schemas.microsoft.com/office/drawing/2014/main" id="{C4BE930E-B576-65A6-7E5D-BFCB3CB9E5B0}"/>
               </a:ext>
             </a:extLst>
           </p:cNvPr>
@@ -4950,9 +4984,10 @@
           <a:lstStyle/>
           <a:p>
             <a:r>
-              <a:rPr lang="en-CA"/>
-              <a:t>Production 1 - Introduction</a:t>
-            </a:r>
+              <a:rPr lang="en-US"/>
+              <a:t>Production 1 - Introduction to ML Systems</a:t>
+            </a:r>
+            <a:endParaRPr lang="en-CA"/>
           </a:p>
         </p:txBody>
       </p:sp>
@@ -4961,7 +4996,7 @@
           <p:cNvPr id="8" name="Slide Number Placeholder 7">
             <a:extLst>
               <a:ext uri="{FF2B5EF4-FFF2-40B4-BE49-F238E27FC236}">
-                <a16:creationId xmlns:a16="http://schemas.microsoft.com/office/drawing/2014/main" id="{7D867A26-546A-26C2-E907-7108CB3907E5}"/>
+                <a16:creationId xmlns:a16="http://schemas.microsoft.com/office/drawing/2014/main" id="{8318ABEF-2DA7-EE09-1F19-59BEEA2EA77F}"/>
               </a:ext>
             </a:extLst>
           </p:cNvPr>
@@ -5044,7 +5079,7 @@
           <p:cNvPr id="3" name="Date Placeholder 2">
             <a:extLst>
               <a:ext uri="{FF2B5EF4-FFF2-40B4-BE49-F238E27FC236}">
-                <a16:creationId xmlns:a16="http://schemas.microsoft.com/office/drawing/2014/main" id="{F24FBC92-DC06-3203-663F-A33F7B0D6660}"/>
+                <a16:creationId xmlns:a16="http://schemas.microsoft.com/office/drawing/2014/main" id="{E9D03D96-0663-57C8-683E-3D6C859A79FB}"/>
               </a:ext>
             </a:extLst>
           </p:cNvPr>
@@ -5061,9 +5096,10 @@
           <a:lstStyle/>
           <a:p>
             <a:r>
-              <a:rPr lang="en-CA"/>
+              <a:rPr lang="en-US"/>
               <a:t>February 2024</a:t>
             </a:r>
+            <a:endParaRPr lang="en-CA"/>
           </a:p>
         </p:txBody>
       </p:sp>
@@ -5072,7 +5108,7 @@
           <p:cNvPr id="4" name="Footer Placeholder 3">
             <a:extLst>
               <a:ext uri="{FF2B5EF4-FFF2-40B4-BE49-F238E27FC236}">
-                <a16:creationId xmlns:a16="http://schemas.microsoft.com/office/drawing/2014/main" id="{F107F42A-E31B-4AAD-9F5B-16754E287262}"/>
+                <a16:creationId xmlns:a16="http://schemas.microsoft.com/office/drawing/2014/main" id="{1738B0A6-7BA9-48F2-452E-D1843A7635A5}"/>
               </a:ext>
             </a:extLst>
           </p:cNvPr>
@@ -5089,9 +5125,10 @@
           <a:lstStyle/>
           <a:p>
             <a:r>
-              <a:rPr lang="en-CA"/>
-              <a:t>Production 1 - Introduction</a:t>
-            </a:r>
+              <a:rPr lang="en-US"/>
+              <a:t>Production 1 - Introduction to ML Systems</a:t>
+            </a:r>
+            <a:endParaRPr lang="en-CA"/>
           </a:p>
         </p:txBody>
       </p:sp>
@@ -5100,7 +5137,7 @@
           <p:cNvPr id="5" name="Slide Number Placeholder 4">
             <a:extLst>
               <a:ext uri="{FF2B5EF4-FFF2-40B4-BE49-F238E27FC236}">
-                <a16:creationId xmlns:a16="http://schemas.microsoft.com/office/drawing/2014/main" id="{7F8B316E-D046-BB07-589F-CF0204C4DED5}"/>
+                <a16:creationId xmlns:a16="http://schemas.microsoft.com/office/drawing/2014/main" id="{37280957-07A2-94DC-FE3B-A6F9CC8C1336}"/>
               </a:ext>
             </a:extLst>
           </p:cNvPr>
@@ -5537,7 +5574,7 @@
           <p:cNvPr id="3" name="Date Placeholder 2">
             <a:extLst>
               <a:ext uri="{FF2B5EF4-FFF2-40B4-BE49-F238E27FC236}">
-                <a16:creationId xmlns:a16="http://schemas.microsoft.com/office/drawing/2014/main" id="{C960F375-1291-BB5B-1B2B-D69694787258}"/>
+                <a16:creationId xmlns:a16="http://schemas.microsoft.com/office/drawing/2014/main" id="{4DCA8036-E02C-8ED5-C936-6E1DAECC1F4E}"/>
               </a:ext>
             </a:extLst>
           </p:cNvPr>
@@ -5554,9 +5591,10 @@
           <a:lstStyle/>
           <a:p>
             <a:r>
-              <a:rPr lang="en-CA"/>
+              <a:rPr lang="en-US"/>
               <a:t>February 2024</a:t>
             </a:r>
+            <a:endParaRPr lang="en-CA"/>
           </a:p>
         </p:txBody>
       </p:sp>
@@ -5565,7 +5603,7 @@
           <p:cNvPr id="4" name="Footer Placeholder 3">
             <a:extLst>
               <a:ext uri="{FF2B5EF4-FFF2-40B4-BE49-F238E27FC236}">
-                <a16:creationId xmlns:a16="http://schemas.microsoft.com/office/drawing/2014/main" id="{8BC9D78B-EA95-70AA-AAEA-EA87F1855D5D}"/>
+                <a16:creationId xmlns:a16="http://schemas.microsoft.com/office/drawing/2014/main" id="{2DC508CF-1E36-C9BD-AC45-B761406971E2}"/>
               </a:ext>
             </a:extLst>
           </p:cNvPr>
@@ -5582,9 +5620,10 @@
           <a:lstStyle/>
           <a:p>
             <a:r>
-              <a:rPr lang="en-CA"/>
-              <a:t>Production 1 - Introduction</a:t>
-            </a:r>
+              <a:rPr lang="en-US"/>
+              <a:t>Production 1 - Introduction to ML Systems</a:t>
+            </a:r>
+            <a:endParaRPr lang="en-CA"/>
           </a:p>
         </p:txBody>
       </p:sp>
@@ -5593,7 +5632,7 @@
           <p:cNvPr id="5" name="Slide Number Placeholder 4">
             <a:extLst>
               <a:ext uri="{FF2B5EF4-FFF2-40B4-BE49-F238E27FC236}">
-                <a16:creationId xmlns:a16="http://schemas.microsoft.com/office/drawing/2014/main" id="{D828C32F-77D0-0243-FA19-91F708E099D0}"/>
+                <a16:creationId xmlns:a16="http://schemas.microsoft.com/office/drawing/2014/main" id="{92AB7844-3C62-5084-9E02-795EC9C55F3F}"/>
               </a:ext>
             </a:extLst>
           </p:cNvPr>
@@ -5832,7 +5871,7 @@
           <p:cNvPr id="6" name="Date Placeholder 5">
             <a:extLst>
               <a:ext uri="{FF2B5EF4-FFF2-40B4-BE49-F238E27FC236}">
-                <a16:creationId xmlns:a16="http://schemas.microsoft.com/office/drawing/2014/main" id="{1F3C2A74-60CC-034D-B406-AF3531C5CD0F}"/>
+                <a16:creationId xmlns:a16="http://schemas.microsoft.com/office/drawing/2014/main" id="{8B7D930F-8A45-41A9-52B5-4AE136AC3298}"/>
               </a:ext>
             </a:extLst>
           </p:cNvPr>
@@ -5849,9 +5888,10 @@
           <a:lstStyle/>
           <a:p>
             <a:r>
-              <a:rPr lang="en-CA"/>
+              <a:rPr lang="en-US"/>
               <a:t>February 2024</a:t>
             </a:r>
+            <a:endParaRPr lang="en-CA"/>
           </a:p>
         </p:txBody>
       </p:sp>
@@ -5860,7 +5900,7 @@
           <p:cNvPr id="7" name="Footer Placeholder 6">
             <a:extLst>
               <a:ext uri="{FF2B5EF4-FFF2-40B4-BE49-F238E27FC236}">
-                <a16:creationId xmlns:a16="http://schemas.microsoft.com/office/drawing/2014/main" id="{47D5C945-17CA-3D23-A53C-FFAEC56071BA}"/>
+                <a16:creationId xmlns:a16="http://schemas.microsoft.com/office/drawing/2014/main" id="{D189855D-7B19-DC5D-E88C-854C6F51EA13}"/>
               </a:ext>
             </a:extLst>
           </p:cNvPr>
@@ -5877,9 +5917,10 @@
           <a:lstStyle/>
           <a:p>
             <a:r>
-              <a:rPr lang="en-CA"/>
-              <a:t>Production 1 - Introduction</a:t>
-            </a:r>
+              <a:rPr lang="en-US"/>
+              <a:t>Production 1 - Introduction to ML Systems</a:t>
+            </a:r>
+            <a:endParaRPr lang="en-CA"/>
           </a:p>
         </p:txBody>
       </p:sp>
@@ -5888,7 +5929,7 @@
           <p:cNvPr id="8" name="Slide Number Placeholder 7">
             <a:extLst>
               <a:ext uri="{FF2B5EF4-FFF2-40B4-BE49-F238E27FC236}">
-                <a16:creationId xmlns:a16="http://schemas.microsoft.com/office/drawing/2014/main" id="{2890547E-7FDD-11AA-A90C-EE39A554D535}"/>
+                <a16:creationId xmlns:a16="http://schemas.microsoft.com/office/drawing/2014/main" id="{4CB1385F-319F-D622-D3C9-0339E5527606}"/>
               </a:ext>
             </a:extLst>
           </p:cNvPr>
@@ -6068,7 +6109,7 @@
           <p:cNvPr id="5" name="Date Placeholder 4">
             <a:extLst>
               <a:ext uri="{FF2B5EF4-FFF2-40B4-BE49-F238E27FC236}">
-                <a16:creationId xmlns:a16="http://schemas.microsoft.com/office/drawing/2014/main" id="{BCD66D29-CF56-0458-6D4D-0F60E0E774D8}"/>
+                <a16:creationId xmlns:a16="http://schemas.microsoft.com/office/drawing/2014/main" id="{CC832941-0FCA-6FF4-4CFE-2CAE3DD51061}"/>
               </a:ext>
             </a:extLst>
           </p:cNvPr>
@@ -6085,9 +6126,10 @@
           <a:lstStyle/>
           <a:p>
             <a:r>
-              <a:rPr lang="en-CA"/>
+              <a:rPr lang="en-US"/>
               <a:t>February 2024</a:t>
             </a:r>
+            <a:endParaRPr lang="en-CA"/>
           </a:p>
         </p:txBody>
       </p:sp>
@@ -6096,7 +6138,7 @@
           <p:cNvPr id="6" name="Footer Placeholder 5">
             <a:extLst>
               <a:ext uri="{FF2B5EF4-FFF2-40B4-BE49-F238E27FC236}">
-                <a16:creationId xmlns:a16="http://schemas.microsoft.com/office/drawing/2014/main" id="{F3AC3743-55A2-25C3-023D-CB78A98A1103}"/>
+                <a16:creationId xmlns:a16="http://schemas.microsoft.com/office/drawing/2014/main" id="{FC3EF0C6-1C32-5AA8-9E85-2978B797D69F}"/>
               </a:ext>
             </a:extLst>
           </p:cNvPr>
@@ -6113,9 +6155,10 @@
           <a:lstStyle/>
           <a:p>
             <a:r>
-              <a:rPr lang="en-CA"/>
-              <a:t>Production 1 - Introduction</a:t>
-            </a:r>
+              <a:rPr lang="en-US"/>
+              <a:t>Production 1 - Introduction to ML Systems</a:t>
+            </a:r>
+            <a:endParaRPr lang="en-CA"/>
           </a:p>
         </p:txBody>
       </p:sp>
@@ -6124,7 +6167,7 @@
           <p:cNvPr id="7" name="Slide Number Placeholder 6">
             <a:extLst>
               <a:ext uri="{FF2B5EF4-FFF2-40B4-BE49-F238E27FC236}">
-                <a16:creationId xmlns:a16="http://schemas.microsoft.com/office/drawing/2014/main" id="{EB8101C4-5632-5E41-9A90-C29A57B71977}"/>
+                <a16:creationId xmlns:a16="http://schemas.microsoft.com/office/drawing/2014/main" id="{CFF0122D-B3D3-2E92-EB6E-06F6F25F4E9A}"/>
               </a:ext>
             </a:extLst>
           </p:cNvPr>
@@ -6207,7 +6250,7 @@
           <p:cNvPr id="3" name="Date Placeholder 2">
             <a:extLst>
               <a:ext uri="{FF2B5EF4-FFF2-40B4-BE49-F238E27FC236}">
-                <a16:creationId xmlns:a16="http://schemas.microsoft.com/office/drawing/2014/main" id="{A1D263A2-056E-06AC-CD8B-5744B8AEA8A4}"/>
+                <a16:creationId xmlns:a16="http://schemas.microsoft.com/office/drawing/2014/main" id="{284693DC-2ACD-3A8B-62F4-A27AC9A727EA}"/>
               </a:ext>
             </a:extLst>
           </p:cNvPr>
@@ -6224,9 +6267,10 @@
           <a:lstStyle/>
           <a:p>
             <a:r>
-              <a:rPr lang="en-CA"/>
+              <a:rPr lang="en-US"/>
               <a:t>February 2024</a:t>
             </a:r>
+            <a:endParaRPr lang="en-CA"/>
           </a:p>
         </p:txBody>
       </p:sp>
@@ -6235,7 +6279,7 @@
           <p:cNvPr id="4" name="Footer Placeholder 3">
             <a:extLst>
               <a:ext uri="{FF2B5EF4-FFF2-40B4-BE49-F238E27FC236}">
-                <a16:creationId xmlns:a16="http://schemas.microsoft.com/office/drawing/2014/main" id="{92AFF4FA-F95E-EAD4-0A24-9300DFC74AF1}"/>
+                <a16:creationId xmlns:a16="http://schemas.microsoft.com/office/drawing/2014/main" id="{C8A5FA0F-2D37-6EDF-025C-1FAF7607598A}"/>
               </a:ext>
             </a:extLst>
           </p:cNvPr>
@@ -6252,9 +6296,10 @@
           <a:lstStyle/>
           <a:p>
             <a:r>
-              <a:rPr lang="en-CA"/>
-              <a:t>Production 1 - Introduction</a:t>
-            </a:r>
+              <a:rPr lang="en-US"/>
+              <a:t>Production 1 - Introduction to ML Systems</a:t>
+            </a:r>
+            <a:endParaRPr lang="en-CA"/>
           </a:p>
         </p:txBody>
       </p:sp>
@@ -6263,7 +6308,7 @@
           <p:cNvPr id="5" name="Slide Number Placeholder 4">
             <a:extLst>
               <a:ext uri="{FF2B5EF4-FFF2-40B4-BE49-F238E27FC236}">
-                <a16:creationId xmlns:a16="http://schemas.microsoft.com/office/drawing/2014/main" id="{8724440E-20BE-40A7-AB04-A49A76794E31}"/>
+                <a16:creationId xmlns:a16="http://schemas.microsoft.com/office/drawing/2014/main" id="{89ADDE46-DE60-5A32-0864-13837EB87BFE}"/>
               </a:ext>
             </a:extLst>
           </p:cNvPr>
@@ -6346,7 +6391,7 @@
           <p:cNvPr id="3" name="Date Placeholder 2">
             <a:extLst>
               <a:ext uri="{FF2B5EF4-FFF2-40B4-BE49-F238E27FC236}">
-                <a16:creationId xmlns:a16="http://schemas.microsoft.com/office/drawing/2014/main" id="{31CDBBE5-F730-2114-0F3F-B97891E60DEC}"/>
+                <a16:creationId xmlns:a16="http://schemas.microsoft.com/office/drawing/2014/main" id="{41903A2A-AE32-9703-1505-85D689A2798C}"/>
               </a:ext>
             </a:extLst>
           </p:cNvPr>
@@ -6363,9 +6408,10 @@
           <a:lstStyle/>
           <a:p>
             <a:r>
-              <a:rPr lang="en-CA"/>
+              <a:rPr lang="en-US"/>
               <a:t>February 2024</a:t>
             </a:r>
+            <a:endParaRPr lang="en-CA"/>
           </a:p>
         </p:txBody>
       </p:sp>
@@ -6374,7 +6420,7 @@
           <p:cNvPr id="4" name="Footer Placeholder 3">
             <a:extLst>
               <a:ext uri="{FF2B5EF4-FFF2-40B4-BE49-F238E27FC236}">
-                <a16:creationId xmlns:a16="http://schemas.microsoft.com/office/drawing/2014/main" id="{62B7F1D4-92CA-2F35-3F03-72B2E0242798}"/>
+                <a16:creationId xmlns:a16="http://schemas.microsoft.com/office/drawing/2014/main" id="{BC2D3696-964F-29F3-863F-7F228B45FF8E}"/>
               </a:ext>
             </a:extLst>
           </p:cNvPr>
@@ -6391,9 +6437,10 @@
           <a:lstStyle/>
           <a:p>
             <a:r>
-              <a:rPr lang="en-CA"/>
-              <a:t>Production 1 - Introduction</a:t>
-            </a:r>
+              <a:rPr lang="en-US"/>
+              <a:t>Production 1 - Introduction to ML Systems</a:t>
+            </a:r>
+            <a:endParaRPr lang="en-CA"/>
           </a:p>
         </p:txBody>
       </p:sp>
@@ -6402,7 +6449,7 @@
           <p:cNvPr id="5" name="Slide Number Placeholder 4">
             <a:extLst>
               <a:ext uri="{FF2B5EF4-FFF2-40B4-BE49-F238E27FC236}">
-                <a16:creationId xmlns:a16="http://schemas.microsoft.com/office/drawing/2014/main" id="{4C97DCE0-A845-5531-09E3-BF2744588EAA}"/>
+                <a16:creationId xmlns:a16="http://schemas.microsoft.com/office/drawing/2014/main" id="{55CED265-5759-AAEC-8CFC-DD24814018C7}"/>
               </a:ext>
             </a:extLst>
           </p:cNvPr>
@@ -6539,7 +6586,7 @@
           <p:cNvPr id="5" name="Date Placeholder 4">
             <a:extLst>
               <a:ext uri="{FF2B5EF4-FFF2-40B4-BE49-F238E27FC236}">
-                <a16:creationId xmlns:a16="http://schemas.microsoft.com/office/drawing/2014/main" id="{5750E484-898E-B78B-3A38-B46403B65029}"/>
+                <a16:creationId xmlns:a16="http://schemas.microsoft.com/office/drawing/2014/main" id="{C54A99A6-8E56-8F4D-A42B-45E1A08266F6}"/>
               </a:ext>
             </a:extLst>
           </p:cNvPr>
@@ -6556,9 +6603,10 @@
           <a:lstStyle/>
           <a:p>
             <a:r>
-              <a:rPr lang="en-CA"/>
+              <a:rPr lang="en-US"/>
               <a:t>February 2024</a:t>
             </a:r>
+            <a:endParaRPr lang="en-CA"/>
           </a:p>
         </p:txBody>
       </p:sp>
@@ -6567,7 +6615,7 @@
           <p:cNvPr id="6" name="Footer Placeholder 5">
             <a:extLst>
               <a:ext uri="{FF2B5EF4-FFF2-40B4-BE49-F238E27FC236}">
-                <a16:creationId xmlns:a16="http://schemas.microsoft.com/office/drawing/2014/main" id="{0641972D-4285-0ABA-B4F1-C4DB722A6723}"/>
+                <a16:creationId xmlns:a16="http://schemas.microsoft.com/office/drawing/2014/main" id="{5B8BADC5-5901-2A42-50D7-7C5A51EA7780}"/>
               </a:ext>
             </a:extLst>
           </p:cNvPr>
@@ -6584,9 +6632,10 @@
           <a:lstStyle/>
           <a:p>
             <a:r>
-              <a:rPr lang="en-CA"/>
-              <a:t>Production 1 - Introduction</a:t>
-            </a:r>
+              <a:rPr lang="en-US"/>
+              <a:t>Production 1 - Introduction to ML Systems</a:t>
+            </a:r>
+            <a:endParaRPr lang="en-CA"/>
           </a:p>
         </p:txBody>
       </p:sp>
@@ -6595,7 +6644,7 @@
           <p:cNvPr id="7" name="Slide Number Placeholder 6">
             <a:extLst>
               <a:ext uri="{FF2B5EF4-FFF2-40B4-BE49-F238E27FC236}">
-                <a16:creationId xmlns:a16="http://schemas.microsoft.com/office/drawing/2014/main" id="{D342E21C-0E6C-A83D-2DB7-AD7ABDF2C750}"/>
+                <a16:creationId xmlns:a16="http://schemas.microsoft.com/office/drawing/2014/main" id="{DB418ED3-8808-069C-BB41-76242F724929}"/>
               </a:ext>
             </a:extLst>
           </p:cNvPr>
@@ -6782,7 +6831,7 @@
           <p:cNvPr id="6" name="Date Placeholder 5">
             <a:extLst>
               <a:ext uri="{FF2B5EF4-FFF2-40B4-BE49-F238E27FC236}">
-                <a16:creationId xmlns:a16="http://schemas.microsoft.com/office/drawing/2014/main" id="{CE38DB54-37FF-0F6B-DF12-CC51153DDD1C}"/>
+                <a16:creationId xmlns:a16="http://schemas.microsoft.com/office/drawing/2014/main" id="{C4A2DC7C-C50F-34E9-2D77-90EF52C83078}"/>
               </a:ext>
             </a:extLst>
           </p:cNvPr>
@@ -6799,9 +6848,10 @@
           <a:lstStyle/>
           <a:p>
             <a:r>
-              <a:rPr lang="en-CA"/>
+              <a:rPr lang="en-US"/>
               <a:t>February 2024</a:t>
             </a:r>
+            <a:endParaRPr lang="en-CA"/>
           </a:p>
         </p:txBody>
       </p:sp>
@@ -6810,7 +6860,7 @@
           <p:cNvPr id="7" name="Footer Placeholder 6">
             <a:extLst>
               <a:ext uri="{FF2B5EF4-FFF2-40B4-BE49-F238E27FC236}">
-                <a16:creationId xmlns:a16="http://schemas.microsoft.com/office/drawing/2014/main" id="{E4191A76-0946-C9E2-E6D0-BFF1EB6680A3}"/>
+                <a16:creationId xmlns:a16="http://schemas.microsoft.com/office/drawing/2014/main" id="{10FEF946-A4FB-ACA4-AA76-A1F51B0ACA13}"/>
               </a:ext>
             </a:extLst>
           </p:cNvPr>
@@ -6827,9 +6877,10 @@
           <a:lstStyle/>
           <a:p>
             <a:r>
-              <a:rPr lang="en-CA"/>
-              <a:t>Production 1 - Introduction</a:t>
-            </a:r>
+              <a:rPr lang="en-US"/>
+              <a:t>Production 1 - Introduction to ML Systems</a:t>
+            </a:r>
+            <a:endParaRPr lang="en-CA"/>
           </a:p>
         </p:txBody>
       </p:sp>
@@ -6838,7 +6889,7 @@
           <p:cNvPr id="8" name="Slide Number Placeholder 7">
             <a:extLst>
               <a:ext uri="{FF2B5EF4-FFF2-40B4-BE49-F238E27FC236}">
-                <a16:creationId xmlns:a16="http://schemas.microsoft.com/office/drawing/2014/main" id="{BA0C053E-44A7-DEFB-C52D-16C45E2C596E}"/>
+                <a16:creationId xmlns:a16="http://schemas.microsoft.com/office/drawing/2014/main" id="{FBAF85F0-ABFC-A3E1-6AC4-3997F6BC355F}"/>
               </a:ext>
             </a:extLst>
           </p:cNvPr>
@@ -7052,7 +7103,7 @@
           <p:cNvPr id="5" name="Date Placeholder 4">
             <a:extLst>
               <a:ext uri="{FF2B5EF4-FFF2-40B4-BE49-F238E27FC236}">
-                <a16:creationId xmlns:a16="http://schemas.microsoft.com/office/drawing/2014/main" id="{32FB9834-389B-3DCA-1E05-D78D9333053F}"/>
+                <a16:creationId xmlns:a16="http://schemas.microsoft.com/office/drawing/2014/main" id="{370FB95F-4823-BEE2-714D-B45D6855BCAC}"/>
               </a:ext>
             </a:extLst>
           </p:cNvPr>
@@ -7069,9 +7120,10 @@
           <a:lstStyle/>
           <a:p>
             <a:r>
-              <a:rPr lang="en-CA"/>
+              <a:rPr lang="en-US"/>
               <a:t>February 2024</a:t>
             </a:r>
+            <a:endParaRPr lang="en-CA"/>
           </a:p>
         </p:txBody>
       </p:sp>
@@ -7080,7 +7132,7 @@
           <p:cNvPr id="6" name="Footer Placeholder 5">
             <a:extLst>
               <a:ext uri="{FF2B5EF4-FFF2-40B4-BE49-F238E27FC236}">
-                <a16:creationId xmlns:a16="http://schemas.microsoft.com/office/drawing/2014/main" id="{63C4F476-0E32-6869-1E09-AFF4890CB713}"/>
+                <a16:creationId xmlns:a16="http://schemas.microsoft.com/office/drawing/2014/main" id="{274ED35B-D642-DD55-6793-064D023FA549}"/>
               </a:ext>
             </a:extLst>
           </p:cNvPr>
@@ -7097,9 +7149,10 @@
           <a:lstStyle/>
           <a:p>
             <a:r>
-              <a:rPr lang="en-CA"/>
-              <a:t>Production 1 - Introduction</a:t>
-            </a:r>
+              <a:rPr lang="en-US"/>
+              <a:t>Production 1 - Introduction to ML Systems</a:t>
+            </a:r>
+            <a:endParaRPr lang="en-CA"/>
           </a:p>
         </p:txBody>
       </p:sp>
@@ -7108,7 +7161,7 @@
           <p:cNvPr id="7" name="Slide Number Placeholder 6">
             <a:extLst>
               <a:ext uri="{FF2B5EF4-FFF2-40B4-BE49-F238E27FC236}">
-                <a16:creationId xmlns:a16="http://schemas.microsoft.com/office/drawing/2014/main" id="{15899B8F-E404-3683-995D-03D07E702EF7}"/>
+                <a16:creationId xmlns:a16="http://schemas.microsoft.com/office/drawing/2014/main" id="{B255054D-9BCD-697C-819E-8DAC248DA89E}"/>
               </a:ext>
             </a:extLst>
           </p:cNvPr>
@@ -7191,7 +7244,7 @@
           <p:cNvPr id="3" name="Date Placeholder 2">
             <a:extLst>
               <a:ext uri="{FF2B5EF4-FFF2-40B4-BE49-F238E27FC236}">
-                <a16:creationId xmlns:a16="http://schemas.microsoft.com/office/drawing/2014/main" id="{0EA751EB-25AD-FC17-C828-28057A3BAA27}"/>
+                <a16:creationId xmlns:a16="http://schemas.microsoft.com/office/drawing/2014/main" id="{350ED634-9E69-78CD-E3CE-3DAE10C4DC10}"/>
               </a:ext>
             </a:extLst>
           </p:cNvPr>
@@ -7208,9 +7261,10 @@
           <a:lstStyle/>
           <a:p>
             <a:r>
-              <a:rPr lang="en-CA"/>
+              <a:rPr lang="en-US"/>
               <a:t>February 2024</a:t>
             </a:r>
+            <a:endParaRPr lang="en-CA"/>
           </a:p>
         </p:txBody>
       </p:sp>
@@ -7219,7 +7273,7 @@
           <p:cNvPr id="4" name="Footer Placeholder 3">
             <a:extLst>
               <a:ext uri="{FF2B5EF4-FFF2-40B4-BE49-F238E27FC236}">
-                <a16:creationId xmlns:a16="http://schemas.microsoft.com/office/drawing/2014/main" id="{5E32E143-2CC5-12C4-3FD8-44176F2620F8}"/>
+                <a16:creationId xmlns:a16="http://schemas.microsoft.com/office/drawing/2014/main" id="{66890973-2434-0C6F-70A7-77520CE86D8F}"/>
               </a:ext>
             </a:extLst>
           </p:cNvPr>
@@ -7236,9 +7290,10 @@
           <a:lstStyle/>
           <a:p>
             <a:r>
-              <a:rPr lang="en-CA"/>
-              <a:t>Production 1 - Introduction</a:t>
-            </a:r>
+              <a:rPr lang="en-US"/>
+              <a:t>Production 1 - Introduction to ML Systems</a:t>
+            </a:r>
+            <a:endParaRPr lang="en-CA"/>
           </a:p>
         </p:txBody>
       </p:sp>
@@ -7247,7 +7302,7 @@
           <p:cNvPr id="5" name="Slide Number Placeholder 4">
             <a:extLst>
               <a:ext uri="{FF2B5EF4-FFF2-40B4-BE49-F238E27FC236}">
-                <a16:creationId xmlns:a16="http://schemas.microsoft.com/office/drawing/2014/main" id="{625710FD-6D80-741D-4A1E-AF65CAE3D8CE}"/>
+                <a16:creationId xmlns:a16="http://schemas.microsoft.com/office/drawing/2014/main" id="{71FE4FD2-02CF-72C1-A712-43D504572AAF}"/>
               </a:ext>
             </a:extLst>
           </p:cNvPr>
@@ -7452,7 +7507,7 @@
           <p:cNvPr id="7" name="Date Placeholder 6">
             <a:extLst>
               <a:ext uri="{FF2B5EF4-FFF2-40B4-BE49-F238E27FC236}">
-                <a16:creationId xmlns:a16="http://schemas.microsoft.com/office/drawing/2014/main" id="{A53C3DA4-DF49-BC3F-ED2E-3E711032BF72}"/>
+                <a16:creationId xmlns:a16="http://schemas.microsoft.com/office/drawing/2014/main" id="{2001CE9D-CF86-E672-7314-3848202077DA}"/>
               </a:ext>
             </a:extLst>
           </p:cNvPr>
@@ -7469,9 +7524,10 @@
           <a:lstStyle/>
           <a:p>
             <a:r>
-              <a:rPr lang="en-CA"/>
+              <a:rPr lang="en-US"/>
               <a:t>February 2024</a:t>
             </a:r>
+            <a:endParaRPr lang="en-CA"/>
           </a:p>
         </p:txBody>
       </p:sp>
@@ -7480,7 +7536,7 @@
           <p:cNvPr id="8" name="Footer Placeholder 7">
             <a:extLst>
               <a:ext uri="{FF2B5EF4-FFF2-40B4-BE49-F238E27FC236}">
-                <a16:creationId xmlns:a16="http://schemas.microsoft.com/office/drawing/2014/main" id="{66FF7136-A24D-C885-9BEA-F27B5D6A142A}"/>
+                <a16:creationId xmlns:a16="http://schemas.microsoft.com/office/drawing/2014/main" id="{F70806B4-9FC9-1035-4BA8-5C14249BB767}"/>
               </a:ext>
             </a:extLst>
           </p:cNvPr>
@@ -7497,9 +7553,10 @@
           <a:lstStyle/>
           <a:p>
             <a:r>
-              <a:rPr lang="en-CA"/>
-              <a:t>Production 1 - Introduction</a:t>
-            </a:r>
+              <a:rPr lang="en-US"/>
+              <a:t>Production 1 - Introduction to ML Systems</a:t>
+            </a:r>
+            <a:endParaRPr lang="en-CA"/>
           </a:p>
         </p:txBody>
       </p:sp>
@@ -7508,7 +7565,7 @@
           <p:cNvPr id="9" name="Slide Number Placeholder 8">
             <a:extLst>
               <a:ext uri="{FF2B5EF4-FFF2-40B4-BE49-F238E27FC236}">
-                <a16:creationId xmlns:a16="http://schemas.microsoft.com/office/drawing/2014/main" id="{F81DE08B-90D3-3090-37B4-3EEB0768A79B}"/>
+                <a16:creationId xmlns:a16="http://schemas.microsoft.com/office/drawing/2014/main" id="{EB9F6DBE-8BB0-FC62-D7D6-298B2FE924DB}"/>
               </a:ext>
             </a:extLst>
           </p:cNvPr>
@@ -7736,7 +7793,7 @@
           <p:cNvPr id="5" name="Date Placeholder 4">
             <a:extLst>
               <a:ext uri="{FF2B5EF4-FFF2-40B4-BE49-F238E27FC236}">
-                <a16:creationId xmlns:a16="http://schemas.microsoft.com/office/drawing/2014/main" id="{F05AF8E6-5EBA-3D2F-8116-EE1F3514390B}"/>
+                <a16:creationId xmlns:a16="http://schemas.microsoft.com/office/drawing/2014/main" id="{C818393F-0657-40D0-32C5-694274E9049D}"/>
               </a:ext>
             </a:extLst>
           </p:cNvPr>
@@ -7753,9 +7810,10 @@
           <a:lstStyle/>
           <a:p>
             <a:r>
-              <a:rPr lang="en-CA"/>
+              <a:rPr lang="en-US"/>
               <a:t>February 2024</a:t>
             </a:r>
+            <a:endParaRPr lang="en-CA"/>
           </a:p>
         </p:txBody>
       </p:sp>
@@ -7764,7 +7822,7 @@
           <p:cNvPr id="6" name="Footer Placeholder 5">
             <a:extLst>
               <a:ext uri="{FF2B5EF4-FFF2-40B4-BE49-F238E27FC236}">
-                <a16:creationId xmlns:a16="http://schemas.microsoft.com/office/drawing/2014/main" id="{674AC3FF-EAAD-9A5B-2215-8ED533D2B4EC}"/>
+                <a16:creationId xmlns:a16="http://schemas.microsoft.com/office/drawing/2014/main" id="{1823653C-7F6E-B78F-3C0F-405FBB05E758}"/>
               </a:ext>
             </a:extLst>
           </p:cNvPr>
@@ -7781,9 +7839,10 @@
           <a:lstStyle/>
           <a:p>
             <a:r>
-              <a:rPr lang="en-CA"/>
-              <a:t>Production 1 - Introduction</a:t>
-            </a:r>
+              <a:rPr lang="en-US"/>
+              <a:t>Production 1 - Introduction to ML Systems</a:t>
+            </a:r>
+            <a:endParaRPr lang="en-CA"/>
           </a:p>
         </p:txBody>
       </p:sp>
@@ -7792,7 +7851,7 @@
           <p:cNvPr id="7" name="Slide Number Placeholder 6">
             <a:extLst>
               <a:ext uri="{FF2B5EF4-FFF2-40B4-BE49-F238E27FC236}">
-                <a16:creationId xmlns:a16="http://schemas.microsoft.com/office/drawing/2014/main" id="{53C91700-1634-513A-323C-9453B360D1F9}"/>
+                <a16:creationId xmlns:a16="http://schemas.microsoft.com/office/drawing/2014/main" id="{A1E4ED17-E574-7D4D-09F2-95F4BBC516D9}"/>
               </a:ext>
             </a:extLst>
           </p:cNvPr>
@@ -7865,8 +7924,8 @@
           </a:p>
         </p:txBody>
       </p:sp>
-      <mc:AlternateContent xmlns:mc="http://schemas.openxmlformats.org/markup-compatibility/2006">
-        <mc:Choice xmlns:a14="http://schemas.microsoft.com/office/drawing/2010/main" Requires="a14">
+      <mc:AlternateContent xmlns:mc="http://schemas.openxmlformats.org/markup-compatibility/2006" xmlns:a14="http://schemas.microsoft.com/office/drawing/2010/main">
+        <mc:Choice Requires="a14">
           <p:sp>
             <p:nvSpPr>
               <p:cNvPr id="3" name="Content Placeholder 2"/>
@@ -8241,7 +8300,7 @@
             </p:txBody>
           </p:sp>
         </mc:Choice>
-        <mc:Fallback>
+        <mc:Fallback xmlns="">
           <p:sp>
             <p:nvSpPr>
               <p:cNvPr id="3" name="Content Placeholder 2"/>
@@ -8343,7 +8402,7 @@
           <p:cNvPr id="5" name="Date Placeholder 4">
             <a:extLst>
               <a:ext uri="{FF2B5EF4-FFF2-40B4-BE49-F238E27FC236}">
-                <a16:creationId xmlns:a16="http://schemas.microsoft.com/office/drawing/2014/main" id="{F1FB829B-7278-FA28-B04D-5C0E29F31AA7}"/>
+                <a16:creationId xmlns:a16="http://schemas.microsoft.com/office/drawing/2014/main" id="{DBA5E776-07A3-5884-2996-D8B1586FCEB5}"/>
               </a:ext>
             </a:extLst>
           </p:cNvPr>
@@ -8360,9 +8419,10 @@
           <a:lstStyle/>
           <a:p>
             <a:r>
-              <a:rPr lang="en-CA"/>
+              <a:rPr lang="en-US"/>
               <a:t>February 2024</a:t>
             </a:r>
+            <a:endParaRPr lang="en-CA"/>
           </a:p>
         </p:txBody>
       </p:sp>
@@ -8371,7 +8431,7 @@
           <p:cNvPr id="6" name="Footer Placeholder 5">
             <a:extLst>
               <a:ext uri="{FF2B5EF4-FFF2-40B4-BE49-F238E27FC236}">
-                <a16:creationId xmlns:a16="http://schemas.microsoft.com/office/drawing/2014/main" id="{2EBFECAF-AE23-2465-0251-8DF597933BC3}"/>
+                <a16:creationId xmlns:a16="http://schemas.microsoft.com/office/drawing/2014/main" id="{7EBCF5A8-7D82-864D-BB95-73988A83947A}"/>
               </a:ext>
             </a:extLst>
           </p:cNvPr>
@@ -8388,9 +8448,10 @@
           <a:lstStyle/>
           <a:p>
             <a:r>
-              <a:rPr lang="en-CA"/>
-              <a:t>Production 1 - Introduction</a:t>
-            </a:r>
+              <a:rPr lang="en-US"/>
+              <a:t>Production 1 - Introduction to ML Systems</a:t>
+            </a:r>
+            <a:endParaRPr lang="en-CA"/>
           </a:p>
         </p:txBody>
       </p:sp>
@@ -8399,7 +8460,7 @@
           <p:cNvPr id="7" name="Slide Number Placeholder 6">
             <a:extLst>
               <a:ext uri="{FF2B5EF4-FFF2-40B4-BE49-F238E27FC236}">
-                <a16:creationId xmlns:a16="http://schemas.microsoft.com/office/drawing/2014/main" id="{75F234D3-FE29-7450-3923-FA37A570B482}"/>
+                <a16:creationId xmlns:a16="http://schemas.microsoft.com/office/drawing/2014/main" id="{A5FD842A-145F-5782-1676-D37BE46BDE1C}"/>
               </a:ext>
             </a:extLst>
           </p:cNvPr>
@@ -8531,7 +8592,7 @@
           <p:cNvPr id="4" name="Date Placeholder 3">
             <a:extLst>
               <a:ext uri="{FF2B5EF4-FFF2-40B4-BE49-F238E27FC236}">
-                <a16:creationId xmlns:a16="http://schemas.microsoft.com/office/drawing/2014/main" id="{F2E6CEB8-D38F-02F9-F368-C92FA4419EE9}"/>
+                <a16:creationId xmlns:a16="http://schemas.microsoft.com/office/drawing/2014/main" id="{243C4892-7BAA-6EED-CBF5-AF4DCE88B400}"/>
               </a:ext>
             </a:extLst>
           </p:cNvPr>
@@ -8548,9 +8609,10 @@
           <a:lstStyle/>
           <a:p>
             <a:r>
-              <a:rPr lang="en-CA"/>
+              <a:rPr lang="en-US"/>
               <a:t>February 2024</a:t>
             </a:r>
+            <a:endParaRPr lang="en-CA"/>
           </a:p>
         </p:txBody>
       </p:sp>
@@ -8559,7 +8621,7 @@
           <p:cNvPr id="5" name="Footer Placeholder 4">
             <a:extLst>
               <a:ext uri="{FF2B5EF4-FFF2-40B4-BE49-F238E27FC236}">
-                <a16:creationId xmlns:a16="http://schemas.microsoft.com/office/drawing/2014/main" id="{AF34AD75-D6AA-B71F-858D-C8D37482B3E0}"/>
+                <a16:creationId xmlns:a16="http://schemas.microsoft.com/office/drawing/2014/main" id="{26FAEB6A-BE3B-F18D-51EC-AC4B179B8B4E}"/>
               </a:ext>
             </a:extLst>
           </p:cNvPr>
@@ -8576,9 +8638,10 @@
           <a:lstStyle/>
           <a:p>
             <a:r>
-              <a:rPr lang="en-CA"/>
-              <a:t>Production 1 - Introduction</a:t>
-            </a:r>
+              <a:rPr lang="en-US"/>
+              <a:t>Production 1 - Introduction to ML Systems</a:t>
+            </a:r>
+            <a:endParaRPr lang="en-CA"/>
           </a:p>
         </p:txBody>
       </p:sp>
@@ -8587,7 +8650,7 @@
           <p:cNvPr id="6" name="Slide Number Placeholder 5">
             <a:extLst>
               <a:ext uri="{FF2B5EF4-FFF2-40B4-BE49-F238E27FC236}">
-                <a16:creationId xmlns:a16="http://schemas.microsoft.com/office/drawing/2014/main" id="{FB010674-5D21-C1A3-4B55-401EC539103F}"/>
+                <a16:creationId xmlns:a16="http://schemas.microsoft.com/office/drawing/2014/main" id="{3FD2EE84-1859-90D6-7D98-607C1E61A4EA}"/>
               </a:ext>
             </a:extLst>
           </p:cNvPr>
@@ -8769,37 +8832,37 @@
             </a:pPr>
             <a:r>
               <a:rPr b="1"/>
-              <a:t>Technical Discussion: Setting Up a Code Repository</a:t>
+              <a:t>1.3 Project Setup</a:t>
             </a:r>
           </a:p>
           <a:p>
             <a:pPr lvl="0"/>
             <a:r>
-              <a:t>Sign up for a GitHub Account</a:t>
+              <a:t>Git, authorization, and production pipelines.</a:t>
             </a:r>
           </a:p>
           <a:p>
             <a:pPr lvl="0"/>
             <a:r>
-              <a:t>Install Git.</a:t>
+              <a:t>VS Code and Git.</a:t>
             </a:r>
           </a:p>
           <a:p>
             <a:pPr lvl="0"/>
             <a:r>
-              <a:t>Setup SSH Key.</a:t>
+              <a:t>Python virtual environments.</a:t>
             </a:r>
           </a:p>
           <a:p>
             <a:pPr lvl="0"/>
             <a:r>
-              <a:t>Create a Repository.</a:t>
+              <a:t>Repo File Structure.</a:t>
             </a:r>
           </a:p>
           <a:p>
             <a:pPr lvl="0"/>
             <a:r>
-              <a:t>Branching Strategies</a:t>
+              <a:t>Branching Strategies.</a:t>
             </a:r>
           </a:p>
           <a:p>
@@ -8815,7 +8878,7 @@
           <p:cNvPr id="5" name="Date Placeholder 4">
             <a:extLst>
               <a:ext uri="{FF2B5EF4-FFF2-40B4-BE49-F238E27FC236}">
-                <a16:creationId xmlns:a16="http://schemas.microsoft.com/office/drawing/2014/main" id="{B714CAC1-95B2-EC62-EB2F-8F52C4E0875B}"/>
+                <a16:creationId xmlns:a16="http://schemas.microsoft.com/office/drawing/2014/main" id="{EA69E410-0FBA-ADA0-CA61-BD618EB354B4}"/>
               </a:ext>
             </a:extLst>
           </p:cNvPr>
@@ -8832,9 +8895,10 @@
           <a:lstStyle/>
           <a:p>
             <a:r>
-              <a:rPr lang="en-CA"/>
+              <a:rPr lang="en-US"/>
               <a:t>February 2024</a:t>
             </a:r>
+            <a:endParaRPr lang="en-CA"/>
           </a:p>
         </p:txBody>
       </p:sp>
@@ -8843,7 +8907,7 @@
           <p:cNvPr id="6" name="Footer Placeholder 5">
             <a:extLst>
               <a:ext uri="{FF2B5EF4-FFF2-40B4-BE49-F238E27FC236}">
-                <a16:creationId xmlns:a16="http://schemas.microsoft.com/office/drawing/2014/main" id="{2EA744EB-4D7C-CECA-9D18-85C81CEAB79D}"/>
+                <a16:creationId xmlns:a16="http://schemas.microsoft.com/office/drawing/2014/main" id="{E25150B9-BBE5-407C-F87C-7527E979B933}"/>
               </a:ext>
             </a:extLst>
           </p:cNvPr>
@@ -8860,9 +8924,10 @@
           <a:lstStyle/>
           <a:p>
             <a:r>
-              <a:rPr lang="en-CA"/>
-              <a:t>Production 1 - Introduction</a:t>
-            </a:r>
+              <a:rPr lang="en-US"/>
+              <a:t>Production 1 - Introduction to ML Systems</a:t>
+            </a:r>
+            <a:endParaRPr lang="en-CA"/>
           </a:p>
         </p:txBody>
       </p:sp>
@@ -8871,7 +8936,7 @@
           <p:cNvPr id="7" name="Slide Number Placeholder 6">
             <a:extLst>
               <a:ext uri="{FF2B5EF4-FFF2-40B4-BE49-F238E27FC236}">
-                <a16:creationId xmlns:a16="http://schemas.microsoft.com/office/drawing/2014/main" id="{F0234041-3277-F78B-96FE-DAFE15BDDD47}"/>
+                <a16:creationId xmlns:a16="http://schemas.microsoft.com/office/drawing/2014/main" id="{B12F11D7-4991-5D96-251F-5C52586D9267}"/>
               </a:ext>
             </a:extLst>
           </p:cNvPr>
@@ -8939,17 +9004,89 @@
               <a:buNone/>
             </a:pPr>
             <a:r>
-              <a:t>Course Specifics</a:t>
-            </a:r>
-          </a:p>
-        </p:txBody>
-      </p:sp>
-      <p:sp>
-        <p:nvSpPr>
-          <p:cNvPr id="3" name="Date Placeholder 2">
+              <a:t>About These Notes</a:t>
+            </a:r>
+          </a:p>
+        </p:txBody>
+      </p:sp>
+      <p:sp>
+        <p:nvSpPr>
+          <p:cNvPr id="3" name="Content Placeholder 2"/>
+          <p:cNvSpPr>
+            <a:spLocks noGrp="1"/>
+          </p:cNvSpPr>
+          <p:nvPr>
+            <p:ph sz="half" idx="1"/>
+          </p:nvPr>
+        </p:nvSpPr>
+        <p:spPr/>
+        <p:txBody>
+          <a:bodyPr/>
+          <a:lstStyle/>
+          <a:p>
+            <a:pPr marL="0" lvl="0" indent="0">
+              <a:buNone/>
+            </a:pPr>
+            <a:r>
+              <a:t>These notes are based on Chapters 1 and 2 of </a:t>
+            </a:r>
+            <a:r>
+              <a:rPr i="1">
+                <a:hlinkClick r:id="rId2"/>
+              </a:rPr>
+              <a:t>Designing Machine Learning Systems</a:t>
+            </a:r>
+            <a:r>
+              <a:t>, by </a:t>
+            </a:r>
+            <a:r>
+              <a:rPr>
+                <a:hlinkClick r:id="rId3"/>
+              </a:rPr>
+              <a:t>Chip Huyen</a:t>
+            </a:r>
+            <a:r>
+              <a:t>.</a:t>
+            </a:r>
+          </a:p>
+        </p:txBody>
+      </p:sp>
+      <p:pic>
+        <p:nvPicPr>
+          <p:cNvPr id="4" name="Picture 1" descr="../img/book_cover.png"/>
+          <p:cNvPicPr>
+            <a:picLocks noGrp="1" noChangeAspect="1"/>
+          </p:cNvPicPr>
+          <p:nvPr/>
+        </p:nvPicPr>
+        <p:blipFill>
+          <a:blip r:embed="rId4"/>
+          <a:stretch>
+            <a:fillRect/>
+          </a:stretch>
+        </p:blipFill>
+        <p:spPr bwMode="auto">
+          <a:xfrm>
+            <a:off x="6096000" y="600075"/>
+            <a:ext cx="4572000" cy="5924549"/>
+          </a:xfrm>
+          <a:prstGeom prst="rect">
+            <a:avLst/>
+          </a:prstGeom>
+          <a:noFill/>
+          <a:ln w="9525">
+            <a:noFill/>
+            <a:headEnd/>
+            <a:tailEnd/>
+          </a:ln>
+        </p:spPr>
+      </p:pic>
+      <p:sp>
+        <p:nvSpPr>
+          <p:cNvPr id="5" name="Date Placeholder 4">
             <a:extLst>
               <a:ext uri="{FF2B5EF4-FFF2-40B4-BE49-F238E27FC236}">
-                <a16:creationId xmlns:a16="http://schemas.microsoft.com/office/drawing/2014/main" id="{3AFDED51-EB77-1028-42E9-CD1501AD0EA6}"/>
+                <a16:creationId xmlns:a16="http://schemas.microsoft.com/office/drawing/2014/main" id="{7A6E0B6D-50AF-D94F-6651-CE24CCF80EBA}"/>
               </a:ext>
             </a:extLst>
           </p:cNvPr>
@@ -8966,18 +9103,19 @@
           <a:lstStyle/>
           <a:p>
             <a:r>
-              <a:rPr lang="en-CA"/>
+              <a:rPr lang="en-US"/>
               <a:t>February 2024</a:t>
             </a:r>
-          </a:p>
-        </p:txBody>
-      </p:sp>
-      <p:sp>
-        <p:nvSpPr>
-          <p:cNvPr id="4" name="Footer Placeholder 3">
+            <a:endParaRPr lang="en-CA"/>
+          </a:p>
+        </p:txBody>
+      </p:sp>
+      <p:sp>
+        <p:nvSpPr>
+          <p:cNvPr id="6" name="Footer Placeholder 5">
             <a:extLst>
               <a:ext uri="{FF2B5EF4-FFF2-40B4-BE49-F238E27FC236}">
-                <a16:creationId xmlns:a16="http://schemas.microsoft.com/office/drawing/2014/main" id="{D3AD7393-0FA3-DE97-B92D-DD0C39100C0D}"/>
+                <a16:creationId xmlns:a16="http://schemas.microsoft.com/office/drawing/2014/main" id="{12CAFF04-BA24-238A-7775-7BE0D9BCBB8F}"/>
               </a:ext>
             </a:extLst>
           </p:cNvPr>
@@ -8994,18 +9132,19 @@
           <a:lstStyle/>
           <a:p>
             <a:r>
-              <a:rPr lang="en-CA"/>
-              <a:t>Production 1 - Introduction</a:t>
-            </a:r>
-          </a:p>
-        </p:txBody>
-      </p:sp>
-      <p:sp>
-        <p:nvSpPr>
-          <p:cNvPr id="5" name="Slide Number Placeholder 4">
+              <a:rPr lang="en-US"/>
+              <a:t>Production 1 - Introduction to ML Systems</a:t>
+            </a:r>
+            <a:endParaRPr lang="en-CA"/>
+          </a:p>
+        </p:txBody>
+      </p:sp>
+      <p:sp>
+        <p:nvSpPr>
+          <p:cNvPr id="7" name="Slide Number Placeholder 6">
             <a:extLst>
               <a:ext uri="{FF2B5EF4-FFF2-40B4-BE49-F238E27FC236}">
-                <a16:creationId xmlns:a16="http://schemas.microsoft.com/office/drawing/2014/main" id="{F247AAF9-F27B-DABF-0097-22E9384EA943}"/>
+                <a16:creationId xmlns:a16="http://schemas.microsoft.com/office/drawing/2014/main" id="{7AD840F2-71F3-26D7-8B80-461F7C07B9DC}"/>
               </a:ext>
             </a:extLst>
           </p:cNvPr>
@@ -9088,7 +9227,7 @@
           <p:cNvPr id="3" name="Date Placeholder 2">
             <a:extLst>
               <a:ext uri="{FF2B5EF4-FFF2-40B4-BE49-F238E27FC236}">
-                <a16:creationId xmlns:a16="http://schemas.microsoft.com/office/drawing/2014/main" id="{B5BF7D01-526D-169D-5708-E5A339465E0C}"/>
+                <a16:creationId xmlns:a16="http://schemas.microsoft.com/office/drawing/2014/main" id="{7193F8BA-7F04-DBDA-BB7A-866AA15EACB4}"/>
               </a:ext>
             </a:extLst>
           </p:cNvPr>
@@ -9105,9 +9244,10 @@
           <a:lstStyle/>
           <a:p>
             <a:r>
-              <a:rPr lang="en-CA"/>
+              <a:rPr lang="en-US"/>
               <a:t>February 2024</a:t>
             </a:r>
+            <a:endParaRPr lang="en-CA"/>
           </a:p>
         </p:txBody>
       </p:sp>
@@ -9116,7 +9256,7 @@
           <p:cNvPr id="4" name="Footer Placeholder 3">
             <a:extLst>
               <a:ext uri="{FF2B5EF4-FFF2-40B4-BE49-F238E27FC236}">
-                <a16:creationId xmlns:a16="http://schemas.microsoft.com/office/drawing/2014/main" id="{021E3518-7150-D855-A47C-5BB7DA3D083F}"/>
+                <a16:creationId xmlns:a16="http://schemas.microsoft.com/office/drawing/2014/main" id="{F3E1B216-7C55-364E-B3A1-87FF41AAD3D4}"/>
               </a:ext>
             </a:extLst>
           </p:cNvPr>
@@ -9133,9 +9273,10 @@
           <a:lstStyle/>
           <a:p>
             <a:r>
-              <a:rPr lang="en-CA"/>
-              <a:t>Production 1 - Introduction</a:t>
-            </a:r>
+              <a:rPr lang="en-US"/>
+              <a:t>Production 1 - Introduction to ML Systems</a:t>
+            </a:r>
+            <a:endParaRPr lang="en-CA"/>
           </a:p>
         </p:txBody>
       </p:sp>
@@ -9144,7 +9285,7 @@
           <p:cNvPr id="5" name="Slide Number Placeholder 4">
             <a:extLst>
               <a:ext uri="{FF2B5EF4-FFF2-40B4-BE49-F238E27FC236}">
-                <a16:creationId xmlns:a16="http://schemas.microsoft.com/office/drawing/2014/main" id="{EE68862F-8225-060B-C5C8-B3B641156A99}"/>
+                <a16:creationId xmlns:a16="http://schemas.microsoft.com/office/drawing/2014/main" id="{E4C1797E-3C48-DDB0-1B62-B3FF5C1E8B62}"/>
               </a:ext>
             </a:extLst>
           </p:cNvPr>
@@ -9252,7 +9393,7 @@
           <p:cNvPr id="4" name="Date Placeholder 3">
             <a:extLst>
               <a:ext uri="{FF2B5EF4-FFF2-40B4-BE49-F238E27FC236}">
-                <a16:creationId xmlns:a16="http://schemas.microsoft.com/office/drawing/2014/main" id="{E5002B57-96F5-B1BA-FDE4-4E0F8AE6F656}"/>
+                <a16:creationId xmlns:a16="http://schemas.microsoft.com/office/drawing/2014/main" id="{5D1D19DB-98DF-7DCC-EB34-F8B75C708224}"/>
               </a:ext>
             </a:extLst>
           </p:cNvPr>
@@ -9269,9 +9410,10 @@
           <a:lstStyle/>
           <a:p>
             <a:r>
-              <a:rPr lang="en-CA"/>
+              <a:rPr lang="en-US"/>
               <a:t>February 2024</a:t>
             </a:r>
+            <a:endParaRPr lang="en-CA"/>
           </a:p>
         </p:txBody>
       </p:sp>
@@ -9280,7 +9422,7 @@
           <p:cNvPr id="5" name="Footer Placeholder 4">
             <a:extLst>
               <a:ext uri="{FF2B5EF4-FFF2-40B4-BE49-F238E27FC236}">
-                <a16:creationId xmlns:a16="http://schemas.microsoft.com/office/drawing/2014/main" id="{C952AF05-304B-691F-B8EF-78F1B2CC945A}"/>
+                <a16:creationId xmlns:a16="http://schemas.microsoft.com/office/drawing/2014/main" id="{5D929979-74E5-C0E0-26C3-D2EC9590EFD3}"/>
               </a:ext>
             </a:extLst>
           </p:cNvPr>
@@ -9297,9 +9439,10 @@
           <a:lstStyle/>
           <a:p>
             <a:r>
-              <a:rPr lang="en-CA"/>
-              <a:t>Production 1 - Introduction</a:t>
-            </a:r>
+              <a:rPr lang="en-US"/>
+              <a:t>Production 1 - Introduction to ML Systems</a:t>
+            </a:r>
+            <a:endParaRPr lang="en-CA"/>
           </a:p>
         </p:txBody>
       </p:sp>
@@ -9308,7 +9451,7 @@
           <p:cNvPr id="6" name="Slide Number Placeholder 5">
             <a:extLst>
               <a:ext uri="{FF2B5EF4-FFF2-40B4-BE49-F238E27FC236}">
-                <a16:creationId xmlns:a16="http://schemas.microsoft.com/office/drawing/2014/main" id="{4B35D269-CF5C-5FA6-D39E-DC3BE762D273}"/>
+                <a16:creationId xmlns:a16="http://schemas.microsoft.com/office/drawing/2014/main" id="{83FE5C40-85D8-425E-4FB1-C83D932848A9}"/>
               </a:ext>
             </a:extLst>
           </p:cNvPr>
@@ -9416,7 +9559,7 @@
           <p:cNvPr id="4" name="Date Placeholder 3">
             <a:extLst>
               <a:ext uri="{FF2B5EF4-FFF2-40B4-BE49-F238E27FC236}">
-                <a16:creationId xmlns:a16="http://schemas.microsoft.com/office/drawing/2014/main" id="{1954AF33-0514-9EDC-C15B-6D80999D2C3C}"/>
+                <a16:creationId xmlns:a16="http://schemas.microsoft.com/office/drawing/2014/main" id="{DB4E0825-C6E0-C6AC-30A6-6452E3C1E84B}"/>
               </a:ext>
             </a:extLst>
           </p:cNvPr>
@@ -9433,9 +9576,10 @@
           <a:lstStyle/>
           <a:p>
             <a:r>
-              <a:rPr lang="en-CA"/>
+              <a:rPr lang="en-US"/>
               <a:t>February 2024</a:t>
             </a:r>
+            <a:endParaRPr lang="en-CA"/>
           </a:p>
         </p:txBody>
       </p:sp>
@@ -9444,7 +9588,7 @@
           <p:cNvPr id="5" name="Footer Placeholder 4">
             <a:extLst>
               <a:ext uri="{FF2B5EF4-FFF2-40B4-BE49-F238E27FC236}">
-                <a16:creationId xmlns:a16="http://schemas.microsoft.com/office/drawing/2014/main" id="{F8DD0988-C161-ED82-20AF-513EE27EF5AE}"/>
+                <a16:creationId xmlns:a16="http://schemas.microsoft.com/office/drawing/2014/main" id="{883B6D55-9235-C93F-2E20-0D6730A4DA2C}"/>
               </a:ext>
             </a:extLst>
           </p:cNvPr>
@@ -9461,9 +9605,10 @@
           <a:lstStyle/>
           <a:p>
             <a:r>
-              <a:rPr lang="en-CA"/>
-              <a:t>Production 1 - Introduction</a:t>
-            </a:r>
+              <a:rPr lang="en-US"/>
+              <a:t>Production 1 - Introduction to ML Systems</a:t>
+            </a:r>
+            <a:endParaRPr lang="en-CA"/>
           </a:p>
         </p:txBody>
       </p:sp>
@@ -9472,7 +9617,7 @@
           <p:cNvPr id="6" name="Slide Number Placeholder 5">
             <a:extLst>
               <a:ext uri="{FF2B5EF4-FFF2-40B4-BE49-F238E27FC236}">
-                <a16:creationId xmlns:a16="http://schemas.microsoft.com/office/drawing/2014/main" id="{3BA17DED-77B5-E99F-D005-00C40CD8C982}"/>
+                <a16:creationId xmlns:a16="http://schemas.microsoft.com/office/drawing/2014/main" id="{AB8843CA-8AFB-3190-BEA7-5E81071EEBCD}"/>
               </a:ext>
             </a:extLst>
           </p:cNvPr>
@@ -9682,7 +9827,7 @@
           <p:cNvPr id="5" name="Date Placeholder 4">
             <a:extLst>
               <a:ext uri="{FF2B5EF4-FFF2-40B4-BE49-F238E27FC236}">
-                <a16:creationId xmlns:a16="http://schemas.microsoft.com/office/drawing/2014/main" id="{071917AA-EFA4-9517-86CC-D4C320B65D6F}"/>
+                <a16:creationId xmlns:a16="http://schemas.microsoft.com/office/drawing/2014/main" id="{843C1D2F-0849-9242-4416-9D9EBA48AF99}"/>
               </a:ext>
             </a:extLst>
           </p:cNvPr>
@@ -9699,9 +9844,10 @@
           <a:lstStyle/>
           <a:p>
             <a:r>
-              <a:rPr lang="en-CA"/>
+              <a:rPr lang="en-US"/>
               <a:t>February 2024</a:t>
             </a:r>
+            <a:endParaRPr lang="en-CA"/>
           </a:p>
         </p:txBody>
       </p:sp>
@@ -9710,7 +9856,7 @@
           <p:cNvPr id="6" name="Footer Placeholder 5">
             <a:extLst>
               <a:ext uri="{FF2B5EF4-FFF2-40B4-BE49-F238E27FC236}">
-                <a16:creationId xmlns:a16="http://schemas.microsoft.com/office/drawing/2014/main" id="{E93AC1EC-B51C-012A-BC66-5CC39A5949C3}"/>
+                <a16:creationId xmlns:a16="http://schemas.microsoft.com/office/drawing/2014/main" id="{F81AF9FF-9845-68EF-FC81-F96417E4775D}"/>
               </a:ext>
             </a:extLst>
           </p:cNvPr>
@@ -9727,9 +9873,10 @@
           <a:lstStyle/>
           <a:p>
             <a:r>
-              <a:rPr lang="en-CA"/>
-              <a:t>Production 1 - Introduction</a:t>
-            </a:r>
+              <a:rPr lang="en-US"/>
+              <a:t>Production 1 - Introduction to ML Systems</a:t>
+            </a:r>
+            <a:endParaRPr lang="en-CA"/>
           </a:p>
         </p:txBody>
       </p:sp>
@@ -9738,7 +9885,7 @@
           <p:cNvPr id="7" name="Slide Number Placeholder 6">
             <a:extLst>
               <a:ext uri="{FF2B5EF4-FFF2-40B4-BE49-F238E27FC236}">
-                <a16:creationId xmlns:a16="http://schemas.microsoft.com/office/drawing/2014/main" id="{D835D77F-D8D5-B7F6-1F8C-45A39E838F95}"/>
+                <a16:creationId xmlns:a16="http://schemas.microsoft.com/office/drawing/2014/main" id="{6856DBD9-4C7A-A59F-E311-3D6A9A48A412}"/>
               </a:ext>
             </a:extLst>
           </p:cNvPr>
@@ -9894,7 +10041,7 @@
           <p:cNvPr id="5" name="Date Placeholder 4">
             <a:extLst>
               <a:ext uri="{FF2B5EF4-FFF2-40B4-BE49-F238E27FC236}">
-                <a16:creationId xmlns:a16="http://schemas.microsoft.com/office/drawing/2014/main" id="{AC8A20FF-AE2C-41CD-6348-12413CAE67FF}"/>
+                <a16:creationId xmlns:a16="http://schemas.microsoft.com/office/drawing/2014/main" id="{163A1ADF-A2AC-30F2-2D0C-17C596FD85D3}"/>
               </a:ext>
             </a:extLst>
           </p:cNvPr>
@@ -9911,9 +10058,10 @@
           <a:lstStyle/>
           <a:p>
             <a:r>
-              <a:rPr lang="en-CA"/>
+              <a:rPr lang="en-US"/>
               <a:t>February 2024</a:t>
             </a:r>
+            <a:endParaRPr lang="en-CA"/>
           </a:p>
         </p:txBody>
       </p:sp>
@@ -9922,7 +10070,7 @@
           <p:cNvPr id="6" name="Footer Placeholder 5">
             <a:extLst>
               <a:ext uri="{FF2B5EF4-FFF2-40B4-BE49-F238E27FC236}">
-                <a16:creationId xmlns:a16="http://schemas.microsoft.com/office/drawing/2014/main" id="{85F675B5-ECE4-C2FE-ED8D-210BA44CDD3D}"/>
+                <a16:creationId xmlns:a16="http://schemas.microsoft.com/office/drawing/2014/main" id="{1948D803-6CEE-3F07-8672-32487FE72260}"/>
               </a:ext>
             </a:extLst>
           </p:cNvPr>
@@ -9939,9 +10087,10 @@
           <a:lstStyle/>
           <a:p>
             <a:r>
-              <a:rPr lang="en-CA"/>
-              <a:t>Production 1 - Introduction</a:t>
-            </a:r>
+              <a:rPr lang="en-US"/>
+              <a:t>Production 1 - Introduction to ML Systems</a:t>
+            </a:r>
+            <a:endParaRPr lang="en-CA"/>
           </a:p>
         </p:txBody>
       </p:sp>
@@ -9950,7 +10099,7 @@
           <p:cNvPr id="7" name="Slide Number Placeholder 6">
             <a:extLst>
               <a:ext uri="{FF2B5EF4-FFF2-40B4-BE49-F238E27FC236}">
-                <a16:creationId xmlns:a16="http://schemas.microsoft.com/office/drawing/2014/main" id="{F3309532-02D5-8B2E-466F-4D0FD2A4EFC6}"/>
+                <a16:creationId xmlns:a16="http://schemas.microsoft.com/office/drawing/2014/main" id="{F4FD3566-F24C-7F75-FAB3-45B80906EF09}"/>
               </a:ext>
             </a:extLst>
           </p:cNvPr>

</xml_diff>